<commit_message>
corrected one slide; improved comment for one Parser method
</commit_message>
<xml_diff>
--- a/PowerPoints/05 - Lexical Analysis.pptx
+++ b/PowerPoints/05 - Lexical Analysis.pptx
@@ -14507,7 +14507,15 @@
           <a:p>
             <a:r>
               <a:rPr lang="en-US" dirty="0"/>
-              <a:t>In general, our compiler will use Java’s exception handling mechanism to signal and report all errors.</a:t>
+              <a:t>In general, our compiler will </a:t>
+            </a:r>
+            <a:r>
+              <a:rPr lang="en-US"/>
+              <a:t>use Kotlin’s </a:t>
+            </a:r>
+            <a:r>
+              <a:rPr lang="en-US" dirty="0"/>
+              <a:t>exception handling mechanism to signal and report all errors.</a:t>
             </a:r>
           </a:p>
           <a:p>

</xml_diff>